<commit_message>
Added Coordinate Generating Functions
for circle and triangle.
If you're nice to me I'll make more shapes
</commit_message>
<xml_diff>
--- a/DEMOII.pptx
+++ b/DEMOII.pptx
@@ -9956,8 +9956,8 @@
         </p:nvSpPr>
         <p:spPr>
           <a:xfrm>
-            <a:off x="1154955" y="4777380"/>
-            <a:ext cx="8825658" cy="861420"/>
+            <a:off x="1154955" y="4777379"/>
+            <a:ext cx="8825658" cy="1346329"/>
           </a:xfrm>
         </p:spPr>
         <p:txBody>
@@ -9967,10 +9967,21 @@
           <a:lstStyle/>
           <a:p>
             <a:r>
-              <a:rPr lang="en-CA"/>
-              <a:t>Control Group</a:t>
+              <a:rPr lang="en-CA" dirty="0"/>
+              <a:t>Control Group </a:t>
             </a:r>
-            <a:endParaRPr lang="en-CA" dirty="0"/>
+          </a:p>
+          <a:p>
+            <a:r>
+              <a:rPr lang="en-CA" dirty="0"/>
+              <a:t>Matthew Gill – 13249157</a:t>
+            </a:r>
+          </a:p>
+          <a:p>
+            <a:r>
+              <a:rPr lang="en-CA" dirty="0"/>
+              <a:t>Graham Whyte - 45688158</a:t>
+            </a:r>
           </a:p>
         </p:txBody>
       </p:sp>
@@ -10127,8 +10138,8 @@
           </a:p>
         </p:txBody>
       </p:sp>
-      <mc:AlternateContent xmlns:mc="http://schemas.openxmlformats.org/markup-compatibility/2006">
-        <mc:Choice xmlns:a14="http://schemas.microsoft.com/office/drawing/2010/main" Requires="a14">
+      <mc:AlternateContent xmlns:mc="http://schemas.openxmlformats.org/markup-compatibility/2006" xmlns:a14="http://schemas.microsoft.com/office/drawing/2010/main">
+        <mc:Choice Requires="a14">
           <p:sp>
             <p:nvSpPr>
               <p:cNvPr id="3" name="Content Placeholder 2">
@@ -10414,7 +10425,7 @@
             </p:txBody>
           </p:sp>
         </mc:Choice>
-        <mc:Fallback>
+        <mc:Fallback xmlns="">
           <p:sp>
             <p:nvSpPr>
               <p:cNvPr id="3" name="Content Placeholder 2">
@@ -21884,8 +21895,8 @@
           <a:effectLst/>
         </p:spPr>
       </p:pic>
-      <mc:AlternateContent xmlns:mc="http://schemas.openxmlformats.org/markup-compatibility/2006">
-        <mc:Choice xmlns:a14="http://schemas.microsoft.com/office/drawing/2010/main" Requires="a14">
+      <mc:AlternateContent xmlns:mc="http://schemas.openxmlformats.org/markup-compatibility/2006" xmlns:a14="http://schemas.microsoft.com/office/drawing/2010/main">
+        <mc:Choice Requires="a14">
           <p:sp>
             <p:nvSpPr>
               <p:cNvPr id="2" name="Title 1">
@@ -22005,7 +22016,7 @@
             </p:txBody>
           </p:sp>
         </mc:Choice>
-        <mc:Fallback>
+        <mc:Fallback xmlns="">
           <p:sp>
             <p:nvSpPr>
               <p:cNvPr id="2" name="Title 1">
@@ -22049,8 +22060,8 @@
           </p:sp>
         </mc:Fallback>
       </mc:AlternateContent>
-      <mc:AlternateContent xmlns:mc="http://schemas.openxmlformats.org/markup-compatibility/2006">
-        <mc:Choice xmlns:a14="http://schemas.microsoft.com/office/drawing/2010/main" Requires="a14">
+      <mc:AlternateContent xmlns:mc="http://schemas.openxmlformats.org/markup-compatibility/2006" xmlns:a14="http://schemas.microsoft.com/office/drawing/2010/main">
+        <mc:Choice Requires="a14">
           <p:sp>
             <p:nvSpPr>
               <p:cNvPr id="3" name="Content Placeholder 2">
@@ -22348,7 +22359,7 @@
             </p:txBody>
           </p:sp>
         </mc:Choice>
-        <mc:Fallback>
+        <mc:Fallback xmlns="">
           <p:sp>
             <p:nvSpPr>
               <p:cNvPr id="3" name="Content Placeholder 2">
@@ -23770,8 +23781,8 @@
           </a:p>
         </p:txBody>
       </p:sp>
-      <mc:AlternateContent xmlns:mc="http://schemas.openxmlformats.org/markup-compatibility/2006">
-        <mc:Choice xmlns:a14="http://schemas.microsoft.com/office/drawing/2010/main" Requires="a14">
+      <mc:AlternateContent xmlns:mc="http://schemas.openxmlformats.org/markup-compatibility/2006" xmlns:a14="http://schemas.microsoft.com/office/drawing/2010/main">
+        <mc:Choice Requires="a14">
           <p:sp>
             <p:nvSpPr>
               <p:cNvPr id="3" name="Content Placeholder 2">
@@ -24047,7 +24058,7 @@
             </p:txBody>
           </p:sp>
         </mc:Choice>
-        <mc:Fallback>
+        <mc:Fallback xmlns="">
           <p:sp>
             <p:nvSpPr>
               <p:cNvPr id="3" name="Content Placeholder 2">
@@ -25454,8 +25465,8 @@
           </a:p>
         </p:txBody>
       </p:sp>
-      <mc:AlternateContent xmlns:mc="http://schemas.openxmlformats.org/markup-compatibility/2006">
-        <mc:Choice xmlns:a14="http://schemas.microsoft.com/office/drawing/2010/main" Requires="a14">
+      <mc:AlternateContent xmlns:mc="http://schemas.openxmlformats.org/markup-compatibility/2006" xmlns:a14="http://schemas.microsoft.com/office/drawing/2010/main">
+        <mc:Choice Requires="a14">
           <p:sp>
             <p:nvSpPr>
               <p:cNvPr id="3" name="Content Placeholder 2">
@@ -26310,7 +26321,7 @@
             </p:txBody>
           </p:sp>
         </mc:Choice>
-        <mc:Fallback>
+        <mc:Fallback xmlns="">
           <p:sp>
             <p:nvSpPr>
               <p:cNvPr id="3" name="Content Placeholder 2">
@@ -26753,8 +26764,8 @@
           </a:p>
         </p:txBody>
       </p:sp>
-      <mc:AlternateContent xmlns:mc="http://schemas.openxmlformats.org/markup-compatibility/2006">
-        <mc:Choice xmlns:a14="http://schemas.microsoft.com/office/drawing/2010/main" Requires="a14">
+      <mc:AlternateContent xmlns:mc="http://schemas.openxmlformats.org/markup-compatibility/2006" xmlns:a14="http://schemas.microsoft.com/office/drawing/2010/main">
+        <mc:Choice Requires="a14">
           <p:sp>
             <p:nvSpPr>
               <p:cNvPr id="49" name="Content Placeholder 32">
@@ -27223,7 +27234,7 @@
             </p:txBody>
           </p:sp>
         </mc:Choice>
-        <mc:Fallback>
+        <mc:Fallback xmlns="">
           <p:sp>
             <p:nvSpPr>
               <p:cNvPr id="49" name="Content Placeholder 32">

</xml_diff>